<commit_message>
wording for spam, ham example
</commit_message>
<xml_diff>
--- a/slides/04_model_evaluation_metrics.pptx
+++ b/slides/04_model_evaluation_metrics.pptx
@@ -13,7 +13,7 @@
     <p:sldId id="477" r:id="rId4"/>
     <p:sldId id="502" r:id="rId5"/>
     <p:sldId id="507" r:id="rId6"/>
-    <p:sldId id="482" r:id="rId7"/>
+    <p:sldId id="511" r:id="rId7"/>
     <p:sldId id="505" r:id="rId8"/>
     <p:sldId id="506" r:id="rId9"/>
     <p:sldId id="483" r:id="rId10"/>
@@ -235,11 +235,11 @@
           <c:showPercent val="0"/>
           <c:showBubbleSize val="0"/>
         </c:dLbls>
-        <c:axId val="33000448"/>
-        <c:axId val="34808576"/>
+        <c:axId val="42676608"/>
+        <c:axId val="42678144"/>
       </c:scatterChart>
       <c:valAx>
-        <c:axId val="33000448"/>
+        <c:axId val="42676608"/>
         <c:scaling>
           <c:orientation val="minMax"/>
         </c:scaling>
@@ -249,13 +249,13 @@
         <c:majorTickMark val="out"/>
         <c:minorTickMark val="none"/>
         <c:tickLblPos val="nextTo"/>
-        <c:crossAx val="34808576"/>
+        <c:crossAx val="42678144"/>
         <c:crosses val="autoZero"/>
         <c:crossBetween val="midCat"/>
         <c:majorUnit val="0.25"/>
       </c:valAx>
       <c:valAx>
-        <c:axId val="34808576"/>
+        <c:axId val="42678144"/>
         <c:scaling>
           <c:orientation val="minMax"/>
         </c:scaling>
@@ -265,7 +265,7 @@
         <c:majorTickMark val="out"/>
         <c:minorTickMark val="none"/>
         <c:tickLblPos val="nextTo"/>
-        <c:crossAx val="33000448"/>
+        <c:crossAx val="42676608"/>
         <c:crosses val="autoZero"/>
         <c:crossBetween val="midCat"/>
         <c:majorUnit val="0.25"/>
@@ -8495,94 +8495,98 @@
           <a:p>
             <a:pPr algn="l"/>
             <a:r>
-              <a:rPr lang="en-US" sz="2400" u="sng" smtClean="0">
+              <a:rPr lang="en-US" sz="2400" u="sng" dirty="0" smtClean="0">
                 <a:latin typeface="PFDinTextCompPro-Italic"/>
                 <a:cs typeface="PFDinTextCompPro-Italic"/>
               </a:rPr>
               <a:t>TPR</a:t>
             </a:r>
             <a:r>
-              <a:rPr lang="en-US" sz="2400" smtClean="0">
+              <a:rPr lang="en-US" sz="2400" dirty="0" smtClean="0">
                 <a:latin typeface="PFDinTextCompPro-Italic"/>
                 <a:cs typeface="PFDinTextCompPro-Italic"/>
               </a:rPr>
-              <a:t>: When actual value is </a:t>
-            </a:r>
-            <a:r>
-              <a:rPr lang="en-US" sz="2400" b="1" smtClean="0">
+              <a:t>: When </a:t>
+            </a:r>
+            <a:r>
+              <a:rPr lang="en-US" sz="2400" dirty="0" smtClean="0">
                 <a:latin typeface="PFDinTextCompPro-Italic"/>
                 <a:cs typeface="PFDinTextCompPro-Italic"/>
               </a:rPr>
-              <a:t>spam</a:t>
-            </a:r>
-            <a:r>
-              <a:rPr lang="en-US" sz="2400" smtClean="0">
-                <a:latin typeface="PFDinTextCompPro-Italic"/>
-                <a:cs typeface="PFDinTextCompPro-Italic"/>
-              </a:rPr>
-              <a:t>, how often is prediction </a:t>
-            </a:r>
-            <a:r>
-              <a:rPr lang="en-US" sz="2400" b="1" smtClean="0">
+              <a:t>the prediction is spam, how often is the prediction </a:t>
+            </a:r>
+            <a:r>
+              <a:rPr lang="en-US" sz="2400" b="1" dirty="0" smtClean="0">
                 <a:latin typeface="PFDinTextCompPro-Italic"/>
                 <a:cs typeface="PFDinTextCompPro-Italic"/>
               </a:rPr>
               <a:t>correct</a:t>
             </a:r>
             <a:r>
-              <a:rPr lang="en-US" sz="2400" smtClean="0">
+              <a:rPr lang="en-US" sz="2400" dirty="0" smtClean="0">
                 <a:latin typeface="PFDinTextCompPro-Italic"/>
                 <a:cs typeface="PFDinTextCompPro-Italic"/>
               </a:rPr>
-              <a:t>?</a:t>
-            </a:r>
-          </a:p>
-          <a:p>
-            <a:pPr algn="l"/>
-            <a:endParaRPr lang="en-US" sz="1000" smtClean="0">
+              <a:t>? </a:t>
+            </a:r>
+            <a:endParaRPr lang="en-US" sz="2400" dirty="0" smtClean="0">
               <a:latin typeface="PFDinTextCompPro-Italic"/>
               <a:cs typeface="PFDinTextCompPro-Italic"/>
             </a:endParaRPr>
           </a:p>
           <a:p>
             <a:pPr algn="l"/>
-            <a:r>
-              <a:rPr lang="en-US" sz="2400" u="sng" smtClean="0">
+            <a:endParaRPr lang="en-US" sz="1000" dirty="0" smtClean="0">
+              <a:latin typeface="PFDinTextCompPro-Italic"/>
+              <a:cs typeface="PFDinTextCompPro-Italic"/>
+            </a:endParaRPr>
+          </a:p>
+          <a:p>
+            <a:pPr algn="l"/>
+            <a:r>
+              <a:rPr lang="en-US" sz="2400" u="sng" dirty="0" smtClean="0">
                 <a:latin typeface="PFDinTextCompPro-Italic"/>
                 <a:cs typeface="PFDinTextCompPro-Italic"/>
               </a:rPr>
               <a:t>FPR</a:t>
             </a:r>
             <a:r>
-              <a:rPr lang="en-US" sz="2400" smtClean="0">
+              <a:rPr lang="en-US" sz="2400" dirty="0" smtClean="0">
                 <a:latin typeface="PFDinTextCompPro-Italic"/>
                 <a:cs typeface="PFDinTextCompPro-Italic"/>
               </a:rPr>
-              <a:t>: When actual value is </a:t>
-            </a:r>
-            <a:r>
-              <a:rPr lang="en-US" sz="2400" b="1" smtClean="0">
+              <a:t>: When </a:t>
+            </a:r>
+            <a:r>
+              <a:rPr lang="en-US" sz="2400" dirty="0" smtClean="0">
                 <a:latin typeface="PFDinTextCompPro-Italic"/>
                 <a:cs typeface="PFDinTextCompPro-Italic"/>
               </a:rPr>
-              <a:t>ham</a:t>
-            </a:r>
-            <a:r>
-              <a:rPr lang="en-US" sz="2400" smtClean="0">
+              <a:t>the prediction is spam, </a:t>
+            </a:r>
+            <a:r>
+              <a:rPr lang="en-US" sz="2400" dirty="0" smtClean="0">
                 <a:latin typeface="PFDinTextCompPro-Italic"/>
                 <a:cs typeface="PFDinTextCompPro-Italic"/>
               </a:rPr>
-              <a:t>, how often is prediction </a:t>
-            </a:r>
-            <a:r>
-              <a:rPr lang="en-US" sz="2400" b="1" smtClean="0">
+              <a:t>how often is </a:t>
+            </a:r>
+            <a:r>
+              <a:rPr lang="en-US" sz="2400" dirty="0" smtClean="0">
+                <a:latin typeface="PFDinTextCompPro-Italic"/>
+                <a:cs typeface="PFDinTextCompPro-Italic"/>
+              </a:rPr>
+              <a:t>the prediction </a:t>
+            </a:r>
+            <a:r>
+              <a:rPr lang="en-US" sz="2400" b="1" dirty="0" smtClean="0">
                 <a:latin typeface="PFDinTextCompPro-Italic"/>
                 <a:cs typeface="PFDinTextCompPro-Italic"/>
               </a:rPr>
               <a:t>wrong</a:t>
             </a:r>
             <a:r>
-              <a:rPr lang="en-US" sz="2400" smtClean="0">
+              <a:rPr lang="en-US" sz="2400" dirty="0" smtClean="0">
                 <a:latin typeface="PFDinTextCompPro-Italic"/>
                 <a:cs typeface="PFDinTextCompPro-Italic"/>
               </a:rPr>
@@ -9618,103 +9622,71 @@
           <a:p>
             <a:pPr algn="l"/>
             <a:r>
-              <a:rPr lang="en-US" sz="2400" u="sng" smtClean="0">
+              <a:rPr lang="en-US" sz="2400" u="sng" dirty="0">
                 <a:latin typeface="PFDinTextCompPro-Italic"/>
                 <a:cs typeface="PFDinTextCompPro-Italic"/>
               </a:rPr>
               <a:t>TPR</a:t>
             </a:r>
             <a:r>
-              <a:rPr lang="en-US" sz="2400" smtClean="0">
+              <a:rPr lang="en-US" sz="2400" dirty="0">
                 <a:latin typeface="PFDinTextCompPro-Italic"/>
                 <a:cs typeface="PFDinTextCompPro-Italic"/>
               </a:rPr>
-              <a:t>: When actual value is </a:t>
-            </a:r>
-            <a:r>
-              <a:rPr lang="en-US" sz="2400" b="1" smtClean="0">
-                <a:latin typeface="PFDinTextCompPro-Italic"/>
-                <a:cs typeface="PFDinTextCompPro-Italic"/>
-              </a:rPr>
-              <a:t>spam</a:t>
-            </a:r>
-            <a:r>
-              <a:rPr lang="en-US" sz="2400" smtClean="0">
-                <a:latin typeface="PFDinTextCompPro-Italic"/>
-                <a:cs typeface="PFDinTextCompPro-Italic"/>
-              </a:rPr>
-              <a:t>, how often is prediction </a:t>
-            </a:r>
-            <a:r>
-              <a:rPr lang="en-US" sz="2400" b="1" smtClean="0">
+              <a:t>: When the prediction is spam, how often is the prediction </a:t>
+            </a:r>
+            <a:r>
+              <a:rPr lang="en-US" sz="2400" b="1" dirty="0">
                 <a:latin typeface="PFDinTextCompPro-Italic"/>
                 <a:cs typeface="PFDinTextCompPro-Italic"/>
               </a:rPr>
               <a:t>correct</a:t>
             </a:r>
             <a:r>
-              <a:rPr lang="en-US" sz="2400" smtClean="0">
+              <a:rPr lang="en-US" sz="2400" dirty="0">
+                <a:latin typeface="PFDinTextCompPro-Italic"/>
+                <a:cs typeface="PFDinTextCompPro-Italic"/>
+              </a:rPr>
+              <a:t>? </a:t>
+            </a:r>
+          </a:p>
+          <a:p>
+            <a:pPr algn="l"/>
+            <a:endParaRPr lang="en-US" sz="1000" dirty="0">
+              <a:latin typeface="PFDinTextCompPro-Italic"/>
+              <a:cs typeface="PFDinTextCompPro-Italic"/>
+            </a:endParaRPr>
+          </a:p>
+          <a:p>
+            <a:pPr algn="l"/>
+            <a:r>
+              <a:rPr lang="en-US" sz="2400" u="sng" dirty="0">
+                <a:latin typeface="PFDinTextCompPro-Italic"/>
+                <a:cs typeface="PFDinTextCompPro-Italic"/>
+              </a:rPr>
+              <a:t>FPR</a:t>
+            </a:r>
+            <a:r>
+              <a:rPr lang="en-US" sz="2400" dirty="0">
+                <a:latin typeface="PFDinTextCompPro-Italic"/>
+                <a:cs typeface="PFDinTextCompPro-Italic"/>
+              </a:rPr>
+              <a:t>: When the prediction is spam, how often is the prediction </a:t>
+            </a:r>
+            <a:r>
+              <a:rPr lang="en-US" sz="2400" b="1" dirty="0">
+                <a:latin typeface="PFDinTextCompPro-Italic"/>
+                <a:cs typeface="PFDinTextCompPro-Italic"/>
+              </a:rPr>
+              <a:t>wrong</a:t>
+            </a:r>
+            <a:r>
+              <a:rPr lang="en-US" sz="2400" dirty="0">
                 <a:latin typeface="PFDinTextCompPro-Italic"/>
                 <a:cs typeface="PFDinTextCompPro-Italic"/>
               </a:rPr>
               <a:t>?</a:t>
             </a:r>
-          </a:p>
-          <a:p>
-            <a:pPr algn="l"/>
-            <a:endParaRPr lang="en-US" sz="1000" smtClean="0">
-              <a:latin typeface="PFDinTextCompPro-Italic"/>
-              <a:cs typeface="PFDinTextCompPro-Italic"/>
-            </a:endParaRPr>
-          </a:p>
-          <a:p>
-            <a:pPr algn="l"/>
-            <a:r>
-              <a:rPr lang="en-US" sz="2400" u="sng" smtClean="0">
-                <a:latin typeface="PFDinTextCompPro-Italic"/>
-                <a:cs typeface="PFDinTextCompPro-Italic"/>
-              </a:rPr>
-              <a:t>FPR</a:t>
-            </a:r>
-            <a:r>
-              <a:rPr lang="en-US" sz="2400" smtClean="0">
-                <a:latin typeface="PFDinTextCompPro-Italic"/>
-                <a:cs typeface="PFDinTextCompPro-Italic"/>
-              </a:rPr>
-              <a:t>: When actual value is </a:t>
-            </a:r>
-            <a:r>
-              <a:rPr lang="en-US" sz="2400" b="1" smtClean="0">
-                <a:latin typeface="PFDinTextCompPro-Italic"/>
-                <a:cs typeface="PFDinTextCompPro-Italic"/>
-              </a:rPr>
-              <a:t>ham</a:t>
-            </a:r>
-            <a:r>
-              <a:rPr lang="en-US" sz="2400" smtClean="0">
-                <a:latin typeface="PFDinTextCompPro-Italic"/>
-                <a:cs typeface="PFDinTextCompPro-Italic"/>
-              </a:rPr>
-              <a:t>, how often is prediction </a:t>
-            </a:r>
-            <a:r>
-              <a:rPr lang="en-US" sz="2400" b="1" smtClean="0">
-                <a:latin typeface="PFDinTextCompPro-Italic"/>
-                <a:cs typeface="PFDinTextCompPro-Italic"/>
-              </a:rPr>
-              <a:t>wrong</a:t>
-            </a:r>
-            <a:r>
-              <a:rPr lang="en-US" sz="2400" smtClean="0">
-                <a:latin typeface="PFDinTextCompPro-Italic"/>
-                <a:cs typeface="PFDinTextCompPro-Italic"/>
-              </a:rPr>
-              <a:t>?</a:t>
-            </a:r>
-            <a:endParaRPr lang="en-US" sz="2400" dirty="0" smtClean="0">
-              <a:latin typeface="PFDinTextCompPro-Italic"/>
-              <a:cs typeface="PFDinTextCompPro-Italic"/>
-            </a:endParaRPr>
           </a:p>
         </p:txBody>
       </p:sp>
@@ -12352,7 +12324,7 @@
           <a:graphicData uri="http://schemas.openxmlformats.org/presentationml/2006/ole">
             <mc:AlternateContent xmlns:mc="http://schemas.openxmlformats.org/markup-compatibility/2006">
               <mc:Choice xmlns:v="urn:schemas-microsoft-com:vml" Requires="v">
-                <p:oleObj spid="_x0000_s1029" name="Equation" r:id="rId5" imgW="1917360" imgH="914400" progId="Equation.3">
+                <p:oleObj spid="_x0000_s1031" name="Equation" r:id="rId5" imgW="1917360" imgH="914400" progId="Equation.3">
                   <p:embed/>
                 </p:oleObj>
               </mc:Choice>
@@ -12486,7 +12458,7 @@
           <a:graphicData uri="http://schemas.openxmlformats.org/presentationml/2006/ole">
             <mc:AlternateContent xmlns:mc="http://schemas.openxmlformats.org/markup-compatibility/2006">
               <mc:Choice xmlns:v="urn:schemas-microsoft-com:vml" Requires="v">
-                <p:oleObj spid="_x0000_s1030" name="Equation" r:id="rId7" imgW="1993680" imgH="914400" progId="Equation.3">
+                <p:oleObj spid="_x0000_s1032" name="Equation" r:id="rId7" imgW="1993680" imgH="914400" progId="Equation.3">
                   <p:embed/>
                 </p:oleObj>
               </mc:Choice>
@@ -12859,7 +12831,7 @@
     </p:spTree>
     <p:extLst>
       <p:ext uri="{BB962C8B-B14F-4D97-AF65-F5344CB8AC3E}">
-        <p14:creationId xmlns:p14="http://schemas.microsoft.com/office/powerpoint/2010/main" val="4013041392"/>
+        <p14:creationId xmlns:p14="http://schemas.microsoft.com/office/powerpoint/2010/main" val="82398694"/>
       </p:ext>
     </p:extLst>
   </p:cSld>

</xml_diff>

<commit_message>
Added pdf for model evaluation metrics
</commit_message>
<xml_diff>
--- a/slides/04_model_evaluation_metrics.pptx
+++ b/slides/04_model_evaluation_metrics.pptx
@@ -12215,7 +12215,7 @@
           <a:graphicData uri="http://schemas.openxmlformats.org/presentationml/2006/ole">
             <mc:AlternateContent xmlns:mc="http://schemas.openxmlformats.org/markup-compatibility/2006">
               <mc:Choice xmlns:v="urn:schemas-microsoft-com:vml" Requires="v">
-                <p:oleObj spid="_x0000_s1035" name="Equation" r:id="rId5" imgW="1917360" imgH="914400" progId="Equation.3">
+                <p:oleObj spid="_x0000_s1039" name="Equation" r:id="rId5" imgW="1917360" imgH="914400" progId="Equation.3">
                   <p:embed/>
                 </p:oleObj>
               </mc:Choice>
@@ -12349,7 +12349,7 @@
           <a:graphicData uri="http://schemas.openxmlformats.org/presentationml/2006/ole">
             <mc:AlternateContent xmlns:mc="http://schemas.openxmlformats.org/markup-compatibility/2006">
               <mc:Choice xmlns:v="urn:schemas-microsoft-com:vml" Requires="v">
-                <p:oleObj spid="_x0000_s1036" name="Equation" r:id="rId7" imgW="1993680" imgH="914400" progId="Equation.3">
+                <p:oleObj spid="_x0000_s1040" name="Equation" r:id="rId7" imgW="1993680" imgH="914400" progId="Equation.3">
                   <p:embed/>
                 </p:oleObj>
               </mc:Choice>

</xml_diff>

<commit_message>
Craeted the ROC curve plot
</commit_message>
<xml_diff>
--- a/slides/04_model_evaluation_metrics.pptx
+++ b/slides/04_model_evaluation_metrics.pptx
@@ -6,7 +6,7 @@
     <p:sldMasterId id="2147483649" r:id="rId2"/>
   </p:sldMasterIdLst>
   <p:notesMasterIdLst>
-    <p:notesMasterId r:id="rId15"/>
+    <p:notesMasterId r:id="rId16"/>
   </p:notesMasterIdLst>
   <p:sldIdLst>
     <p:sldId id="473" r:id="rId3"/>
@@ -20,7 +20,8 @@
     <p:sldId id="512" r:id="rId11"/>
     <p:sldId id="508" r:id="rId12"/>
     <p:sldId id="509" r:id="rId13"/>
-    <p:sldId id="510" r:id="rId14"/>
+    <p:sldId id="513" r:id="rId14"/>
+    <p:sldId id="510" r:id="rId15"/>
   </p:sldIdLst>
   <p:sldSz cx="9363075" cy="5257800"/>
   <p:notesSz cx="6858000" cy="9144000"/>
@@ -161,138 +162,6 @@
 </p:presentation>
 </file>
 
-<file path=ppt/charts/chart1.xml><?xml version="1.0" encoding="utf-8"?>
-<c:chartSpace xmlns:c="http://schemas.openxmlformats.org/drawingml/2006/chart" xmlns:a="http://schemas.openxmlformats.org/drawingml/2006/main" xmlns:r="http://schemas.openxmlformats.org/officeDocument/2006/relationships">
-  <c:date1904 val="0"/>
-  <c:lang val="en-US"/>
-  <c:roundedCorners val="0"/>
-  <mc:AlternateContent xmlns:mc="http://schemas.openxmlformats.org/markup-compatibility/2006">
-    <mc:Choice xmlns:c14="http://schemas.microsoft.com/office/drawing/2007/8/2/chart" Requires="c14">
-      <c14:style val="118"/>
-    </mc:Choice>
-    <mc:Fallback>
-      <c:style val="18"/>
-    </mc:Fallback>
-  </mc:AlternateContent>
-  <c:chart>
-    <c:autoTitleDeleted val="1"/>
-    <c:plotArea>
-      <c:layout/>
-      <c:scatterChart>
-        <c:scatterStyle val="lineMarker"/>
-        <c:varyColors val="0"/>
-        <c:ser>
-          <c:idx val="0"/>
-          <c:order val="0"/>
-          <c:tx>
-            <c:strRef>
-              <c:f>Sheet1!$B$1</c:f>
-              <c:strCache>
-                <c:ptCount val="1"/>
-                <c:pt idx="0">
-                  <c:v>Y-Value 1</c:v>
-                </c:pt>
-              </c:strCache>
-            </c:strRef>
-          </c:tx>
-          <c:spPr>
-            <a:ln w="47625">
-              <a:noFill/>
-            </a:ln>
-          </c:spPr>
-          <c:xVal>
-            <c:numRef>
-              <c:f>Sheet1!$A$2</c:f>
-              <c:numCache>
-                <c:formatCode>General</c:formatCode>
-                <c:ptCount val="1"/>
-                <c:pt idx="0">
-                  <c:v>1</c:v>
-                </c:pt>
-              </c:numCache>
-            </c:numRef>
-          </c:xVal>
-          <c:yVal>
-            <c:numRef>
-              <c:f>Sheet1!$B$2</c:f>
-              <c:numCache>
-                <c:formatCode>General</c:formatCode>
-                <c:ptCount val="1"/>
-                <c:pt idx="0">
-                  <c:v>1</c:v>
-                </c:pt>
-              </c:numCache>
-            </c:numRef>
-          </c:yVal>
-          <c:smooth val="0"/>
-        </c:ser>
-        <c:dLbls>
-          <c:showLegendKey val="0"/>
-          <c:showVal val="0"/>
-          <c:showCatName val="0"/>
-          <c:showSerName val="0"/>
-          <c:showPercent val="0"/>
-          <c:showBubbleSize val="0"/>
-        </c:dLbls>
-        <c:axId val="80664448"/>
-        <c:axId val="80665984"/>
-      </c:scatterChart>
-      <c:valAx>
-        <c:axId val="80664448"/>
-        <c:scaling>
-          <c:orientation val="minMax"/>
-          <c:max val="1"/>
-        </c:scaling>
-        <c:delete val="0"/>
-        <c:axPos val="b"/>
-        <c:numFmt formatCode="General" sourceLinked="1"/>
-        <c:majorTickMark val="out"/>
-        <c:minorTickMark val="none"/>
-        <c:tickLblPos val="nextTo"/>
-        <c:crossAx val="80665984"/>
-        <c:crosses val="autoZero"/>
-        <c:crossBetween val="midCat"/>
-        <c:majorUnit val="0.25"/>
-      </c:valAx>
-      <c:valAx>
-        <c:axId val="80665984"/>
-        <c:scaling>
-          <c:orientation val="minMax"/>
-          <c:max val="1"/>
-          <c:min val="0"/>
-        </c:scaling>
-        <c:delete val="0"/>
-        <c:axPos val="l"/>
-        <c:numFmt formatCode="General" sourceLinked="1"/>
-        <c:majorTickMark val="out"/>
-        <c:minorTickMark val="none"/>
-        <c:tickLblPos val="nextTo"/>
-        <c:crossAx val="80664448"/>
-        <c:crosses val="autoZero"/>
-        <c:crossBetween val="midCat"/>
-        <c:majorUnit val="0.25"/>
-      </c:valAx>
-    </c:plotArea>
-    <c:plotVisOnly val="1"/>
-    <c:dispBlanksAs val="gap"/>
-    <c:showDLblsOverMax val="0"/>
-  </c:chart>
-  <c:txPr>
-    <a:bodyPr/>
-    <a:lstStyle/>
-    <a:p>
-      <a:pPr>
-        <a:defRPr sz="1800"/>
-      </a:pPr>
-      <a:endParaRPr lang="en-US"/>
-    </a:p>
-  </c:txPr>
-  <c:externalData r:id="rId1">
-    <c:autoUpdate val="0"/>
-  </c:externalData>
-</c:chartSpace>
-</file>
-
 <file path=ppt/notesMasters/notesMaster1.xml><?xml version="1.0" encoding="utf-8"?>
 <p:notesMaster xmlns:a="http://schemas.openxmlformats.org/drawingml/2006/main" xmlns:r="http://schemas.openxmlformats.org/officeDocument/2006/relationships" xmlns:p="http://schemas.openxmlformats.org/presentationml/2006/main">
   <p:cSld>
@@ -375,7 +244,7 @@
           <a:p>
             <a:fld id="{DB92F479-4B50-F243-9713-1B12EC2B4BDB}" type="datetimeFigureOut">
               <a:rPr lang="en-US" smtClean="0"/>
-              <a:t>3/13/2015</a:t>
+              <a:t>4/9/2015</a:t>
             </a:fld>
             <a:endParaRPr lang="en-US"/>
           </a:p>
@@ -1030,6 +899,113 @@
             <a:fld id="{ADD4B5B7-85EF-4E48-AC80-2380FACD9C23}" type="slidenum">
               <a:rPr lang="en-US" smtClean="0"/>
               <a:t>12</a:t>
+            </a:fld>
+            <a:endParaRPr lang="en-US"/>
+          </a:p>
+        </p:txBody>
+      </p:sp>
+    </p:spTree>
+    <p:extLst>
+      <p:ext uri="{BB962C8B-B14F-4D97-AF65-F5344CB8AC3E}">
+        <p14:creationId xmlns:p14="http://schemas.microsoft.com/office/powerpoint/2010/main" val="645762702"/>
+      </p:ext>
+    </p:extLst>
+  </p:cSld>
+  <p:clrMapOvr>
+    <a:masterClrMapping/>
+  </p:clrMapOvr>
+</p:notes>
+</file>
+
+<file path=ppt/notesSlides/notesSlide13.xml><?xml version="1.0" encoding="utf-8"?>
+<p:notes xmlns:a="http://schemas.openxmlformats.org/drawingml/2006/main" xmlns:r="http://schemas.openxmlformats.org/officeDocument/2006/relationships" xmlns:p="http://schemas.openxmlformats.org/presentationml/2006/main">
+  <p:cSld>
+    <p:spTree>
+      <p:nvGrpSpPr>
+        <p:cNvPr id="1" name=""/>
+        <p:cNvGrpSpPr/>
+        <p:nvPr/>
+      </p:nvGrpSpPr>
+      <p:grpSpPr>
+        <a:xfrm>
+          <a:off x="0" y="0"/>
+          <a:ext cx="0" cy="0"/>
+          <a:chOff x="0" y="0"/>
+          <a:chExt cx="0" cy="0"/>
+        </a:xfrm>
+      </p:grpSpPr>
+      <p:sp>
+        <p:nvSpPr>
+          <p:cNvPr id="2" name="Slide Image Placeholder 1"/>
+          <p:cNvSpPr>
+            <a:spLocks noGrp="1" noRot="1" noChangeAspect="1"/>
+          </p:cNvSpPr>
+          <p:nvPr>
+            <p:ph type="sldImg"/>
+          </p:nvPr>
+        </p:nvSpPr>
+        <p:spPr/>
+      </p:sp>
+      <p:sp>
+        <p:nvSpPr>
+          <p:cNvPr id="3" name="Notes Placeholder 2"/>
+          <p:cNvSpPr>
+            <a:spLocks noGrp="1"/>
+          </p:cNvSpPr>
+          <p:nvPr>
+            <p:ph type="body" idx="1"/>
+          </p:nvPr>
+        </p:nvSpPr>
+        <p:spPr/>
+        <p:txBody>
+          <a:bodyPr/>
+          <a:lstStyle/>
+          <a:p>
+            <a:pPr marL="0" marR="0" indent="0" algn="l" defTabSz="457200" rtl="0" eaLnBrk="1" fontAlgn="auto" latinLnBrk="0" hangingPunct="1">
+              <a:lnSpc>
+                <a:spcPct val="100000"/>
+              </a:lnSpc>
+              <a:spcBef>
+                <a:spcPts val="0"/>
+              </a:spcBef>
+              <a:spcAft>
+                <a:spcPts val="0"/>
+              </a:spcAft>
+              <a:buClrTx/>
+              <a:buSzTx/>
+              <a:buFontTx/>
+              <a:buNone/>
+              <a:tabLst/>
+              <a:defRPr/>
+            </a:pPr>
+            <a:endParaRPr lang="en-US" sz="1200" baseline="0" dirty="0" smtClean="0">
+              <a:solidFill>
+                <a:prstClr val="black"/>
+              </a:solidFill>
+              <a:latin typeface="ArialMT"/>
+              <a:sym typeface="Wingdings"/>
+            </a:endParaRPr>
+          </a:p>
+        </p:txBody>
+      </p:sp>
+      <p:sp>
+        <p:nvSpPr>
+          <p:cNvPr id="4" name="Slide Number Placeholder 3"/>
+          <p:cNvSpPr>
+            <a:spLocks noGrp="1"/>
+          </p:cNvSpPr>
+          <p:nvPr>
+            <p:ph type="sldNum" sz="quarter" idx="10"/>
+          </p:nvPr>
+        </p:nvSpPr>
+        <p:spPr/>
+        <p:txBody>
+          <a:bodyPr/>
+          <a:lstStyle/>
+          <a:p>
+            <a:fld id="{ADD4B5B7-85EF-4E48-AC80-2380FACD9C23}" type="slidenum">
+              <a:rPr lang="en-US" smtClean="0"/>
+              <a:t>13</a:t>
             </a:fld>
             <a:endParaRPr lang="en-US"/>
           </a:p>
@@ -8424,14 +8400,7 @@
                 <a:latin typeface="PFDinTextCompPro-Italic"/>
                 <a:cs typeface="PFDinTextCompPro-Italic"/>
               </a:rPr>
-              <a:t>: When </a:t>
-            </a:r>
-            <a:r>
-              <a:rPr lang="en-US" sz="2400" dirty="0" smtClean="0">
-                <a:latin typeface="PFDinTextCompPro-Italic"/>
-                <a:cs typeface="PFDinTextCompPro-Italic"/>
-              </a:rPr>
-              <a:t>actual value is </a:t>
+              <a:t>: When actual value is </a:t>
             </a:r>
             <a:r>
               <a:rPr lang="en-US" sz="2400" b="1" dirty="0" smtClean="0">
@@ -8461,10 +8430,6 @@
               </a:rPr>
               <a:t>?</a:t>
             </a:r>
-            <a:endParaRPr lang="en-US" sz="2400" dirty="0" smtClean="0">
-              <a:latin typeface="PFDinTextCompPro-Italic"/>
-              <a:cs typeface="PFDinTextCompPro-Italic"/>
-            </a:endParaRPr>
           </a:p>
           <a:p>
             <a:pPr algn="l"/>
@@ -8487,14 +8452,7 @@
                 <a:latin typeface="PFDinTextCompPro-Italic"/>
                 <a:cs typeface="PFDinTextCompPro-Italic"/>
               </a:rPr>
-              <a:t>: When </a:t>
-            </a:r>
-            <a:r>
-              <a:rPr lang="en-US" sz="2400" dirty="0" smtClean="0">
-                <a:latin typeface="PFDinTextCompPro-Italic"/>
-                <a:cs typeface="PFDinTextCompPro-Italic"/>
-              </a:rPr>
-              <a:t>actual value is </a:t>
+              <a:t>: When actual value is </a:t>
             </a:r>
             <a:r>
               <a:rPr lang="en-US" sz="2400" b="1" dirty="0" smtClean="0">
@@ -8508,21 +8466,7 @@
                 <a:latin typeface="PFDinTextCompPro-Italic"/>
                 <a:cs typeface="PFDinTextCompPro-Italic"/>
               </a:rPr>
-              <a:t>, </a:t>
-            </a:r>
-            <a:r>
-              <a:rPr lang="en-US" sz="2400" dirty="0" smtClean="0">
-                <a:latin typeface="PFDinTextCompPro-Italic"/>
-                <a:cs typeface="PFDinTextCompPro-Italic"/>
-              </a:rPr>
-              <a:t>how often is </a:t>
-            </a:r>
-            <a:r>
-              <a:rPr lang="en-US" sz="2400" dirty="0" smtClean="0">
-                <a:latin typeface="PFDinTextCompPro-Italic"/>
-                <a:cs typeface="PFDinTextCompPro-Italic"/>
-              </a:rPr>
-              <a:t>prediction </a:t>
+              <a:t>, how often is prediction </a:t>
             </a:r>
             <a:r>
               <a:rPr lang="en-US" sz="2400" b="1" dirty="0" smtClean="0">
@@ -8538,10 +8482,6 @@
               </a:rPr>
               <a:t>?</a:t>
             </a:r>
-            <a:endParaRPr lang="en-US" sz="2400" dirty="0" smtClean="0">
-              <a:latin typeface="PFDinTextCompPro-Italic"/>
-              <a:cs typeface="PFDinTextCompPro-Italic"/>
-            </a:endParaRPr>
           </a:p>
         </p:txBody>
       </p:sp>
@@ -10612,10 +10552,10 @@
                     <a:lstStyle/>
                     <a:p>
                       <a:r>
-                        <a:rPr lang="en-US" smtClean="0"/>
+                        <a:rPr lang="en-US" dirty="0" smtClean="0"/>
                         <a:t>0</a:t>
                       </a:r>
-                      <a:endParaRPr lang="en-US"/>
+                      <a:endParaRPr lang="en-US" dirty="0"/>
                     </a:p>
                   </a:txBody>
                   <a:tcPr/>
@@ -10671,8 +10611,8 @@
         </p:nvSpPr>
         <p:spPr>
           <a:xfrm>
-            <a:off x="3767137" y="1104900"/>
-            <a:ext cx="5029200" cy="3323987"/>
+            <a:off x="5824537" y="952500"/>
+            <a:ext cx="1524000" cy="553998"/>
           </a:xfrm>
           <a:prstGeom prst="rect">
             <a:avLst/>
@@ -10691,80 +10631,7 @@
                 <a:latin typeface="PFDinTextCompPro-Italic"/>
                 <a:cs typeface="PFDinTextCompPro-Italic"/>
               </a:rPr>
-              <a:t>Q: Would the ROC Curve (and AUC) change if the </a:t>
-            </a:r>
-            <a:r>
-              <a:rPr lang="en-US" sz="3000" b="1" smtClean="0">
-                <a:latin typeface="PFDinTextCompPro-Italic"/>
-                <a:cs typeface="PFDinTextCompPro-Italic"/>
-              </a:rPr>
-              <a:t>scores</a:t>
-            </a:r>
-            <a:r>
-              <a:rPr lang="en-US" sz="3000" smtClean="0">
-                <a:latin typeface="PFDinTextCompPro-Italic"/>
-                <a:cs typeface="PFDinTextCompPro-Italic"/>
-              </a:rPr>
-              <a:t> changed but the </a:t>
-            </a:r>
-            <a:r>
-              <a:rPr lang="en-US" sz="3000" b="1" smtClean="0">
-                <a:latin typeface="PFDinTextCompPro-Italic"/>
-                <a:cs typeface="PFDinTextCompPro-Italic"/>
-              </a:rPr>
-              <a:t>ordering</a:t>
-            </a:r>
-            <a:r>
-              <a:rPr lang="en-US" sz="3000" smtClean="0">
-                <a:latin typeface="PFDinTextCompPro-Italic"/>
-                <a:cs typeface="PFDinTextCompPro-Italic"/>
-              </a:rPr>
-              <a:t> remained the same?</a:t>
-            </a:r>
-          </a:p>
-          <a:p>
-            <a:pPr algn="l"/>
-            <a:endParaRPr lang="en-US" sz="3000" dirty="0">
-              <a:latin typeface="PFDinTextCompPro-Italic"/>
-              <a:cs typeface="PFDinTextCompPro-Italic"/>
-            </a:endParaRPr>
-          </a:p>
-          <a:p>
-            <a:pPr algn="l"/>
-            <a:r>
-              <a:rPr lang="en-US" sz="3000" smtClean="0">
-                <a:latin typeface="PFDinTextCompPro-Italic"/>
-                <a:cs typeface="PFDinTextCompPro-Italic"/>
-              </a:rPr>
-              <a:t>A: Not at all! The ROC Curve is only sensitive to </a:t>
-            </a:r>
-            <a:r>
-              <a:rPr lang="en-US" sz="3000" b="1" smtClean="0">
-                <a:latin typeface="PFDinTextCompPro-Italic"/>
-                <a:cs typeface="PFDinTextCompPro-Italic"/>
-              </a:rPr>
-              <a:t>rank ordering</a:t>
-            </a:r>
-            <a:r>
-              <a:rPr lang="en-US" sz="3000" smtClean="0">
-                <a:latin typeface="PFDinTextCompPro-Italic"/>
-                <a:cs typeface="PFDinTextCompPro-Italic"/>
-              </a:rPr>
-              <a:t> and does not require </a:t>
-            </a:r>
-            <a:r>
-              <a:rPr lang="en-US" sz="3000" b="1" smtClean="0">
-                <a:latin typeface="PFDinTextCompPro-Italic"/>
-                <a:cs typeface="PFDinTextCompPro-Italic"/>
-              </a:rPr>
-              <a:t>calibrated scores</a:t>
-            </a:r>
-            <a:r>
-              <a:rPr lang="en-US" sz="3000" smtClean="0">
-                <a:latin typeface="PFDinTextCompPro-Italic"/>
-                <a:cs typeface="PFDinTextCompPro-Italic"/>
-              </a:rPr>
-              <a:t>.</a:t>
+              <a:t>ROC Curve</a:t>
             </a:r>
             <a:endParaRPr lang="en-US" sz="3000" dirty="0" smtClean="0">
               <a:latin typeface="PFDinTextCompPro-Italic"/>
@@ -10801,7 +10668,7 @@
             </a:pPr>
             <a:r>
               <a:rPr lang="en-US" smtClean="0"/>
-              <a:t>ROC Curve / AUC</a:t>
+              <a:t>ROC CURVE / AUC</a:t>
             </a:r>
             <a:endParaRPr lang="en-US" dirty="0"/>
           </a:p>
@@ -10831,6 +10698,763 @@
                 <a:defRPr/>
               </a:pPr>
               <a:t>12</a:t>
+            </a:fld>
+            <a:endParaRPr lang="en-US"/>
+          </a:p>
+        </p:txBody>
+      </p:sp>
+      <p:graphicFrame>
+        <p:nvGraphicFramePr>
+          <p:cNvPr id="2" name="Table 1"/>
+          <p:cNvGraphicFramePr>
+            <a:graphicFrameLocks noGrp="1"/>
+          </p:cNvGraphicFramePr>
+          <p:nvPr>
+            <p:extLst>
+              <p:ext uri="{D42A27DB-BD31-4B8C-83A1-F6EECF244321}">
+                <p14:modId xmlns:p14="http://schemas.microsoft.com/office/powerpoint/2010/main" val="4165996583"/>
+              </p:ext>
+            </p:extLst>
+          </p:nvPr>
+        </p:nvGraphicFramePr>
+        <p:xfrm>
+          <a:off x="719137" y="1257300"/>
+          <a:ext cx="2663826" cy="3454400"/>
+        </p:xfrm>
+        <a:graphic>
+          <a:graphicData uri="http://schemas.openxmlformats.org/drawingml/2006/table">
+            <a:tbl>
+              <a:tblPr firstRow="1" bandRow="1">
+                <a:tableStyleId>{5C22544A-7EE6-4342-B048-85BDC9FD1C3A}</a:tableStyleId>
+              </a:tblPr>
+              <a:tblGrid>
+                <a:gridCol w="887942"/>
+                <a:gridCol w="887942"/>
+                <a:gridCol w="887942"/>
+              </a:tblGrid>
+              <a:tr h="370840">
+                <a:tc>
+                  <a:txBody>
+                    <a:bodyPr/>
+                    <a:lstStyle/>
+                    <a:p>
+                      <a:r>
+                        <a:rPr lang="en-US" dirty="0" smtClean="0"/>
+                        <a:t>Email Number</a:t>
+                      </a:r>
+                      <a:endParaRPr lang="en-US" dirty="0"/>
+                    </a:p>
+                  </a:txBody>
+                  <a:tcPr/>
+                </a:tc>
+                <a:tc>
+                  <a:txBody>
+                    <a:bodyPr/>
+                    <a:lstStyle/>
+                    <a:p>
+                      <a:r>
+                        <a:rPr lang="en-US" dirty="0" smtClean="0"/>
+                        <a:t>Score</a:t>
+                      </a:r>
+                      <a:endParaRPr lang="en-US" dirty="0"/>
+                    </a:p>
+                  </a:txBody>
+                  <a:tcPr/>
+                </a:tc>
+                <a:tc>
+                  <a:txBody>
+                    <a:bodyPr/>
+                    <a:lstStyle/>
+                    <a:p>
+                      <a:r>
+                        <a:rPr lang="en-US" dirty="0" smtClean="0"/>
+                        <a:t>True Label</a:t>
+                      </a:r>
+                      <a:endParaRPr lang="en-US" dirty="0"/>
+                    </a:p>
+                  </a:txBody>
+                  <a:tcPr/>
+                </a:tc>
+              </a:tr>
+              <a:tr h="370840">
+                <a:tc>
+                  <a:txBody>
+                    <a:bodyPr/>
+                    <a:lstStyle/>
+                    <a:p>
+                      <a:r>
+                        <a:rPr lang="en-US" dirty="0" smtClean="0"/>
+                        <a:t>5</a:t>
+                      </a:r>
+                    </a:p>
+                  </a:txBody>
+                  <a:tcPr/>
+                </a:tc>
+                <a:tc>
+                  <a:txBody>
+                    <a:bodyPr/>
+                    <a:lstStyle/>
+                    <a:p>
+                      <a:r>
+                        <a:rPr lang="en-US" smtClean="0"/>
+                        <a:t>0.99</a:t>
+                      </a:r>
+                      <a:endParaRPr lang="en-US" dirty="0"/>
+                    </a:p>
+                  </a:txBody>
+                  <a:tcPr/>
+                </a:tc>
+                <a:tc>
+                  <a:txBody>
+                    <a:bodyPr/>
+                    <a:lstStyle/>
+                    <a:p>
+                      <a:r>
+                        <a:rPr lang="en-US" dirty="0" smtClean="0"/>
+                        <a:t>Spam</a:t>
+                      </a:r>
+                      <a:endParaRPr lang="en-US" dirty="0"/>
+                    </a:p>
+                  </a:txBody>
+                  <a:tcPr/>
+                </a:tc>
+              </a:tr>
+              <a:tr h="370840">
+                <a:tc>
+                  <a:txBody>
+                    <a:bodyPr/>
+                    <a:lstStyle/>
+                    <a:p>
+                      <a:r>
+                        <a:rPr lang="en-US" dirty="0" smtClean="0"/>
+                        <a:t>8</a:t>
+                      </a:r>
+                      <a:endParaRPr lang="en-US" dirty="0"/>
+                    </a:p>
+                  </a:txBody>
+                  <a:tcPr/>
+                </a:tc>
+                <a:tc>
+                  <a:txBody>
+                    <a:bodyPr/>
+                    <a:lstStyle/>
+                    <a:p>
+                      <a:r>
+                        <a:rPr lang="en-US" smtClean="0"/>
+                        <a:t>0.82</a:t>
+                      </a:r>
+                      <a:endParaRPr lang="en-US" dirty="0"/>
+                    </a:p>
+                  </a:txBody>
+                  <a:tcPr/>
+                </a:tc>
+                <a:tc>
+                  <a:txBody>
+                    <a:bodyPr/>
+                    <a:lstStyle/>
+                    <a:p>
+                      <a:r>
+                        <a:rPr lang="en-US" dirty="0" smtClean="0"/>
+                        <a:t>Spam</a:t>
+                      </a:r>
+                      <a:endParaRPr lang="en-US" dirty="0"/>
+                    </a:p>
+                  </a:txBody>
+                  <a:tcPr/>
+                </a:tc>
+              </a:tr>
+              <a:tr h="370840">
+                <a:tc>
+                  <a:txBody>
+                    <a:bodyPr/>
+                    <a:lstStyle/>
+                    <a:p>
+                      <a:r>
+                        <a:rPr lang="en-US" dirty="0" smtClean="0"/>
+                        <a:t>2</a:t>
+                      </a:r>
+                      <a:endParaRPr lang="en-US" dirty="0"/>
+                    </a:p>
+                  </a:txBody>
+                  <a:tcPr/>
+                </a:tc>
+                <a:tc>
+                  <a:txBody>
+                    <a:bodyPr/>
+                    <a:lstStyle/>
+                    <a:p>
+                      <a:r>
+                        <a:rPr lang="en-US" smtClean="0"/>
+                        <a:t>0.60</a:t>
+                      </a:r>
+                      <a:endParaRPr lang="en-US" dirty="0"/>
+                    </a:p>
+                  </a:txBody>
+                  <a:tcPr/>
+                </a:tc>
+                <a:tc>
+                  <a:txBody>
+                    <a:bodyPr/>
+                    <a:lstStyle/>
+                    <a:p>
+                      <a:r>
+                        <a:rPr lang="en-US" dirty="0" smtClean="0"/>
+                        <a:t>Spam</a:t>
+                      </a:r>
+                      <a:endParaRPr lang="en-US" dirty="0"/>
+                    </a:p>
+                  </a:txBody>
+                  <a:tcPr/>
+                </a:tc>
+              </a:tr>
+              <a:tr h="370840">
+                <a:tc>
+                  <a:txBody>
+                    <a:bodyPr/>
+                    <a:lstStyle/>
+                    <a:p>
+                      <a:r>
+                        <a:rPr lang="en-US" dirty="0" smtClean="0"/>
+                        <a:t>1</a:t>
+                      </a:r>
+                      <a:endParaRPr lang="en-US" dirty="0"/>
+                    </a:p>
+                  </a:txBody>
+                  <a:tcPr/>
+                </a:tc>
+                <a:tc>
+                  <a:txBody>
+                    <a:bodyPr/>
+                    <a:lstStyle/>
+                    <a:p>
+                      <a:r>
+                        <a:rPr lang="en-US" smtClean="0"/>
+                        <a:t>0.60</a:t>
+                      </a:r>
+                      <a:endParaRPr lang="en-US" dirty="0"/>
+                    </a:p>
+                  </a:txBody>
+                  <a:tcPr/>
+                </a:tc>
+                <a:tc>
+                  <a:txBody>
+                    <a:bodyPr/>
+                    <a:lstStyle/>
+                    <a:p>
+                      <a:r>
+                        <a:rPr lang="en-US" dirty="0" smtClean="0"/>
+                        <a:t>Ham</a:t>
+                      </a:r>
+                      <a:endParaRPr lang="en-US" dirty="0"/>
+                    </a:p>
+                  </a:txBody>
+                  <a:tcPr/>
+                </a:tc>
+              </a:tr>
+              <a:tr h="370840">
+                <a:tc>
+                  <a:txBody>
+                    <a:bodyPr/>
+                    <a:lstStyle/>
+                    <a:p>
+                      <a:r>
+                        <a:rPr lang="en-US" dirty="0" smtClean="0"/>
+                        <a:t>7</a:t>
+                      </a:r>
+                      <a:endParaRPr lang="en-US" dirty="0"/>
+                    </a:p>
+                  </a:txBody>
+                  <a:tcPr/>
+                </a:tc>
+                <a:tc>
+                  <a:txBody>
+                    <a:bodyPr/>
+                    <a:lstStyle/>
+                    <a:p>
+                      <a:r>
+                        <a:rPr lang="en-US" smtClean="0"/>
+                        <a:t>0.48</a:t>
+                      </a:r>
+                      <a:endParaRPr lang="en-US" dirty="0"/>
+                    </a:p>
+                  </a:txBody>
+                  <a:tcPr/>
+                </a:tc>
+                <a:tc>
+                  <a:txBody>
+                    <a:bodyPr/>
+                    <a:lstStyle/>
+                    <a:p>
+                      <a:r>
+                        <a:rPr lang="en-US" dirty="0" smtClean="0"/>
+                        <a:t>Spam</a:t>
+                      </a:r>
+                      <a:endParaRPr lang="en-US" dirty="0"/>
+                    </a:p>
+                  </a:txBody>
+                  <a:tcPr/>
+                </a:tc>
+              </a:tr>
+              <a:tr h="370840">
+                <a:tc>
+                  <a:txBody>
+                    <a:bodyPr/>
+                    <a:lstStyle/>
+                    <a:p>
+                      <a:r>
+                        <a:rPr lang="en-US" dirty="0" smtClean="0"/>
+                        <a:t>3</a:t>
+                      </a:r>
+                      <a:endParaRPr lang="en-US" dirty="0"/>
+                    </a:p>
+                  </a:txBody>
+                  <a:tcPr/>
+                </a:tc>
+                <a:tc>
+                  <a:txBody>
+                    <a:bodyPr/>
+                    <a:lstStyle/>
+                    <a:p>
+                      <a:r>
+                        <a:rPr lang="en-US" dirty="0" smtClean="0"/>
+                        <a:t>0.22</a:t>
+                      </a:r>
+                      <a:endParaRPr lang="en-US" dirty="0"/>
+                    </a:p>
+                  </a:txBody>
+                  <a:tcPr/>
+                </a:tc>
+                <a:tc>
+                  <a:txBody>
+                    <a:bodyPr/>
+                    <a:lstStyle/>
+                    <a:p>
+                      <a:r>
+                        <a:rPr lang="en-US" dirty="0" smtClean="0"/>
+                        <a:t>Ham</a:t>
+                      </a:r>
+                      <a:endParaRPr lang="en-US" dirty="0"/>
+                    </a:p>
+                  </a:txBody>
+                  <a:tcPr/>
+                </a:tc>
+              </a:tr>
+              <a:tr h="370840">
+                <a:tc>
+                  <a:txBody>
+                    <a:bodyPr/>
+                    <a:lstStyle/>
+                    <a:p>
+                      <a:r>
+                        <a:rPr lang="en-US" dirty="0" smtClean="0"/>
+                        <a:t>4</a:t>
+                      </a:r>
+                      <a:endParaRPr lang="en-US" dirty="0"/>
+                    </a:p>
+                  </a:txBody>
+                  <a:tcPr/>
+                </a:tc>
+                <a:tc>
+                  <a:txBody>
+                    <a:bodyPr/>
+                    <a:lstStyle/>
+                    <a:p>
+                      <a:r>
+                        <a:rPr lang="en-US" dirty="0" smtClean="0"/>
+                        <a:t>0.10</a:t>
+                      </a:r>
+                      <a:endParaRPr lang="en-US" dirty="0"/>
+                    </a:p>
+                  </a:txBody>
+                  <a:tcPr/>
+                </a:tc>
+                <a:tc>
+                  <a:txBody>
+                    <a:bodyPr/>
+                    <a:lstStyle/>
+                    <a:p>
+                      <a:r>
+                        <a:rPr lang="en-US" dirty="0" smtClean="0"/>
+                        <a:t>Ham</a:t>
+                      </a:r>
+                      <a:endParaRPr lang="en-US" dirty="0"/>
+                    </a:p>
+                  </a:txBody>
+                  <a:tcPr/>
+                </a:tc>
+              </a:tr>
+              <a:tr h="370840">
+                <a:tc>
+                  <a:txBody>
+                    <a:bodyPr/>
+                    <a:lstStyle/>
+                    <a:p>
+                      <a:r>
+                        <a:rPr lang="en-US" dirty="0" smtClean="0"/>
+                        <a:t>6</a:t>
+                      </a:r>
+                      <a:endParaRPr lang="en-US" dirty="0"/>
+                    </a:p>
+                  </a:txBody>
+                  <a:tcPr/>
+                </a:tc>
+                <a:tc>
+                  <a:txBody>
+                    <a:bodyPr/>
+                    <a:lstStyle/>
+                    <a:p>
+                      <a:r>
+                        <a:rPr lang="en-US" dirty="0" smtClean="0"/>
+                        <a:t>0.02</a:t>
+                      </a:r>
+                      <a:endParaRPr lang="en-US" dirty="0"/>
+                    </a:p>
+                  </a:txBody>
+                  <a:tcPr/>
+                </a:tc>
+                <a:tc>
+                  <a:txBody>
+                    <a:bodyPr/>
+                    <a:lstStyle/>
+                    <a:p>
+                      <a:r>
+                        <a:rPr lang="en-US" dirty="0" smtClean="0"/>
+                        <a:t>Ham</a:t>
+                      </a:r>
+                      <a:endParaRPr lang="en-US" dirty="0"/>
+                    </a:p>
+                  </a:txBody>
+                  <a:tcPr/>
+                </a:tc>
+              </a:tr>
+            </a:tbl>
+          </a:graphicData>
+        </a:graphic>
+      </p:graphicFrame>
+      <p:sp>
+        <p:nvSpPr>
+          <p:cNvPr id="7" name="TextBox 6"/>
+          <p:cNvSpPr txBox="1"/>
+          <p:nvPr/>
+        </p:nvSpPr>
+        <p:spPr>
+          <a:xfrm>
+            <a:off x="6510337" y="4741902"/>
+            <a:ext cx="685800" cy="553998"/>
+          </a:xfrm>
+          <a:prstGeom prst="rect">
+            <a:avLst/>
+          </a:prstGeom>
+          <a:noFill/>
+        </p:spPr>
+        <p:txBody>
+          <a:bodyPr wrap="square" rtlCol="0">
+            <a:spAutoFit/>
+          </a:bodyPr>
+          <a:lstStyle/>
+          <a:p>
+            <a:pPr algn="l"/>
+            <a:r>
+              <a:rPr lang="en-US" sz="3000" dirty="0" smtClean="0">
+                <a:latin typeface="PFDinTextCompPro-Italic"/>
+                <a:cs typeface="PFDinTextCompPro-Italic"/>
+              </a:rPr>
+              <a:t>FPR</a:t>
+            </a:r>
+          </a:p>
+        </p:txBody>
+      </p:sp>
+      <p:sp>
+        <p:nvSpPr>
+          <p:cNvPr id="9" name="TextBox 8"/>
+          <p:cNvSpPr txBox="1"/>
+          <p:nvPr/>
+        </p:nvSpPr>
+        <p:spPr>
+          <a:xfrm>
+            <a:off x="4148137" y="2760702"/>
+            <a:ext cx="685800" cy="553998"/>
+          </a:xfrm>
+          <a:prstGeom prst="rect">
+            <a:avLst/>
+          </a:prstGeom>
+          <a:noFill/>
+        </p:spPr>
+        <p:txBody>
+          <a:bodyPr wrap="square" rtlCol="0">
+            <a:spAutoFit/>
+          </a:bodyPr>
+          <a:lstStyle/>
+          <a:p>
+            <a:pPr algn="l"/>
+            <a:r>
+              <a:rPr lang="en-US" sz="3000" dirty="0" smtClean="0">
+                <a:latin typeface="PFDinTextCompPro-Italic"/>
+                <a:cs typeface="PFDinTextCompPro-Italic"/>
+              </a:rPr>
+              <a:t>TPR</a:t>
+            </a:r>
+          </a:p>
+        </p:txBody>
+      </p:sp>
+      <p:pic>
+        <p:nvPicPr>
+          <p:cNvPr id="2051" name="Picture 3"/>
+          <p:cNvPicPr>
+            <a:picLocks noChangeAspect="1" noChangeArrowheads="1"/>
+          </p:cNvPicPr>
+          <p:nvPr/>
+        </p:nvPicPr>
+        <p:blipFill rotWithShape="1">
+          <a:blip r:embed="rId3">
+            <a:extLst>
+              <a:ext uri="{28A0092B-C50C-407E-A947-70E740481C1C}">
+                <a14:useLocalDpi xmlns:a14="http://schemas.microsoft.com/office/drawing/2010/main" val="0"/>
+              </a:ext>
+            </a:extLst>
+          </a:blip>
+          <a:srcRect l="5299" b="5669"/>
+          <a:stretch/>
+        </p:blipFill>
+        <p:spPr bwMode="auto">
+          <a:xfrm>
+            <a:off x="4800585" y="1496268"/>
+            <a:ext cx="3462352" cy="3266232"/>
+          </a:xfrm>
+          <a:prstGeom prst="rect">
+            <a:avLst/>
+          </a:prstGeom>
+          <a:noFill/>
+          <a:ln>
+            <a:noFill/>
+          </a:ln>
+          <a:extLst>
+            <a:ext uri="{909E8E84-426E-40DD-AFC4-6F175D3DCCD1}">
+              <a14:hiddenFill xmlns:a14="http://schemas.microsoft.com/office/drawing/2010/main">
+                <a:solidFill>
+                  <a:schemeClr val="accent1"/>
+                </a:solidFill>
+              </a14:hiddenFill>
+            </a:ext>
+            <a:ext uri="{91240B29-F687-4F45-9708-019B960494DF}">
+              <a14:hiddenLine xmlns:a14="http://schemas.microsoft.com/office/drawing/2010/main" w="9525">
+                <a:solidFill>
+                  <a:schemeClr val="tx1"/>
+                </a:solidFill>
+                <a:miter lim="800000"/>
+                <a:headEnd/>
+                <a:tailEnd/>
+              </a14:hiddenLine>
+            </a:ext>
+          </a:extLst>
+        </p:spPr>
+      </p:pic>
+    </p:spTree>
+    <p:extLst>
+      <p:ext uri="{BB962C8B-B14F-4D97-AF65-F5344CB8AC3E}">
+        <p14:creationId xmlns:p14="http://schemas.microsoft.com/office/powerpoint/2010/main" val="260230227"/>
+      </p:ext>
+    </p:extLst>
+  </p:cSld>
+  <p:clrMapOvr>
+    <a:masterClrMapping/>
+  </p:clrMapOvr>
+  <p:transition/>
+  <p:timing>
+    <p:tnLst>
+      <p:par>
+        <p:cTn id="1" dur="indefinite" restart="never" nodeType="tmRoot"/>
+      </p:par>
+    </p:tnLst>
+  </p:timing>
+</p:sld>
+</file>
+
+<file path=ppt/slides/slide13.xml><?xml version="1.0" encoding="utf-8"?>
+<p:sld xmlns:a="http://schemas.openxmlformats.org/drawingml/2006/main" xmlns:r="http://schemas.openxmlformats.org/officeDocument/2006/relationships" xmlns:p="http://schemas.openxmlformats.org/presentationml/2006/main">
+  <p:cSld>
+    <p:spTree>
+      <p:nvGrpSpPr>
+        <p:cNvPr id="1" name=""/>
+        <p:cNvGrpSpPr/>
+        <p:nvPr/>
+      </p:nvGrpSpPr>
+      <p:grpSpPr>
+        <a:xfrm>
+          <a:off x="0" y="0"/>
+          <a:ext cx="0" cy="0"/>
+          <a:chOff x="0" y="0"/>
+          <a:chExt cx="0" cy="0"/>
+        </a:xfrm>
+      </p:grpSpPr>
+      <p:sp>
+        <p:nvSpPr>
+          <p:cNvPr id="5" name="TextBox 4"/>
+          <p:cNvSpPr txBox="1"/>
+          <p:nvPr/>
+        </p:nvSpPr>
+        <p:spPr>
+          <a:xfrm>
+            <a:off x="3767137" y="1104900"/>
+            <a:ext cx="5029200" cy="3323987"/>
+          </a:xfrm>
+          <a:prstGeom prst="rect">
+            <a:avLst/>
+          </a:prstGeom>
+          <a:noFill/>
+        </p:spPr>
+        <p:txBody>
+          <a:bodyPr wrap="square" rtlCol="0">
+            <a:spAutoFit/>
+          </a:bodyPr>
+          <a:lstStyle/>
+          <a:p>
+            <a:pPr algn="l"/>
+            <a:r>
+              <a:rPr lang="en-US" sz="3000" smtClean="0">
+                <a:latin typeface="PFDinTextCompPro-Italic"/>
+                <a:cs typeface="PFDinTextCompPro-Italic"/>
+              </a:rPr>
+              <a:t>Q: Would the ROC Curve (and AUC) change if the </a:t>
+            </a:r>
+            <a:r>
+              <a:rPr lang="en-US" sz="3000" b="1" smtClean="0">
+                <a:latin typeface="PFDinTextCompPro-Italic"/>
+                <a:cs typeface="PFDinTextCompPro-Italic"/>
+              </a:rPr>
+              <a:t>scores</a:t>
+            </a:r>
+            <a:r>
+              <a:rPr lang="en-US" sz="3000" smtClean="0">
+                <a:latin typeface="PFDinTextCompPro-Italic"/>
+                <a:cs typeface="PFDinTextCompPro-Italic"/>
+              </a:rPr>
+              <a:t> changed but the </a:t>
+            </a:r>
+            <a:r>
+              <a:rPr lang="en-US" sz="3000" b="1" smtClean="0">
+                <a:latin typeface="PFDinTextCompPro-Italic"/>
+                <a:cs typeface="PFDinTextCompPro-Italic"/>
+              </a:rPr>
+              <a:t>ordering</a:t>
+            </a:r>
+            <a:r>
+              <a:rPr lang="en-US" sz="3000" smtClean="0">
+                <a:latin typeface="PFDinTextCompPro-Italic"/>
+                <a:cs typeface="PFDinTextCompPro-Italic"/>
+              </a:rPr>
+              <a:t> remained the same?</a:t>
+            </a:r>
+          </a:p>
+          <a:p>
+            <a:pPr algn="l"/>
+            <a:endParaRPr lang="en-US" sz="3000" dirty="0">
+              <a:latin typeface="PFDinTextCompPro-Italic"/>
+              <a:cs typeface="PFDinTextCompPro-Italic"/>
+            </a:endParaRPr>
+          </a:p>
+          <a:p>
+            <a:pPr algn="l"/>
+            <a:r>
+              <a:rPr lang="en-US" sz="3000" smtClean="0">
+                <a:latin typeface="PFDinTextCompPro-Italic"/>
+                <a:cs typeface="PFDinTextCompPro-Italic"/>
+              </a:rPr>
+              <a:t>A: Not at all! The ROC Curve is only sensitive to </a:t>
+            </a:r>
+            <a:r>
+              <a:rPr lang="en-US" sz="3000" b="1" smtClean="0">
+                <a:latin typeface="PFDinTextCompPro-Italic"/>
+                <a:cs typeface="PFDinTextCompPro-Italic"/>
+              </a:rPr>
+              <a:t>rank ordering</a:t>
+            </a:r>
+            <a:r>
+              <a:rPr lang="en-US" sz="3000" smtClean="0">
+                <a:latin typeface="PFDinTextCompPro-Italic"/>
+                <a:cs typeface="PFDinTextCompPro-Italic"/>
+              </a:rPr>
+              <a:t> and does not require </a:t>
+            </a:r>
+            <a:r>
+              <a:rPr lang="en-US" sz="3000" b="1" smtClean="0">
+                <a:latin typeface="PFDinTextCompPro-Italic"/>
+                <a:cs typeface="PFDinTextCompPro-Italic"/>
+              </a:rPr>
+              <a:t>calibrated scores</a:t>
+            </a:r>
+            <a:r>
+              <a:rPr lang="en-US" sz="3000" smtClean="0">
+                <a:latin typeface="PFDinTextCompPro-Italic"/>
+                <a:cs typeface="PFDinTextCompPro-Italic"/>
+              </a:rPr>
+              <a:t>.</a:t>
+            </a:r>
+            <a:endParaRPr lang="en-US" sz="3000" dirty="0" smtClean="0">
+              <a:latin typeface="PFDinTextCompPro-Italic"/>
+              <a:cs typeface="PFDinTextCompPro-Italic"/>
+            </a:endParaRPr>
+          </a:p>
+        </p:txBody>
+      </p:sp>
+      <p:sp>
+        <p:nvSpPr>
+          <p:cNvPr id="4" name="Content Placeholder 3"/>
+          <p:cNvSpPr>
+            <a:spLocks noGrp="1"/>
+          </p:cNvSpPr>
+          <p:nvPr>
+            <p:ph sz="quarter" idx="11"/>
+          </p:nvPr>
+        </p:nvSpPr>
+        <p:spPr>
+          <a:xfrm>
+            <a:off x="414337" y="495300"/>
+            <a:ext cx="6400800" cy="304800"/>
+          </a:xfrm>
+        </p:spPr>
+        <p:txBody>
+          <a:bodyPr/>
+          <a:lstStyle/>
+          <a:p>
+            <a:pPr eaLnBrk="1" hangingPunct="1">
+              <a:lnSpc>
+                <a:spcPts val="2448"/>
+              </a:lnSpc>
+              <a:defRPr/>
+            </a:pPr>
+            <a:r>
+              <a:rPr lang="en-US" smtClean="0"/>
+              <a:t>ROC Curve / AUC</a:t>
+            </a:r>
+            <a:endParaRPr lang="en-US" dirty="0"/>
+          </a:p>
+        </p:txBody>
+      </p:sp>
+      <p:sp>
+        <p:nvSpPr>
+          <p:cNvPr id="8" name="Slide Number Placeholder 3"/>
+          <p:cNvSpPr>
+            <a:spLocks noGrp="1"/>
+          </p:cNvSpPr>
+          <p:nvPr>
+            <p:ph type="sldNum" sz="quarter" idx="13"/>
+          </p:nvPr>
+        </p:nvSpPr>
+        <p:spPr/>
+        <p:txBody>
+          <a:bodyPr/>
+          <a:lstStyle/>
+          <a:p>
+            <a:pPr>
+              <a:defRPr/>
+            </a:pPr>
+            <a:fld id="{BD5AD749-DAD1-6A4A-A2AA-CB20EAD0AEB7}" type="slidenum">
+              <a:rPr lang="en-US"/>
+              <a:pPr>
+                <a:defRPr/>
+              </a:pPr>
+              <a:t>13</a:t>
             </a:fld>
             <a:endParaRPr lang="en-US"/>
           </a:p>
@@ -12215,7 +12839,7 @@
           <a:graphicData uri="http://schemas.openxmlformats.org/presentationml/2006/ole">
             <mc:AlternateContent xmlns:mc="http://schemas.openxmlformats.org/markup-compatibility/2006">
               <mc:Choice xmlns:v="urn:schemas-microsoft-com:vml" Requires="v">
-                <p:oleObj spid="_x0000_s1039" name="Equation" r:id="rId5" imgW="1917360" imgH="914400" progId="Equation.3">
+                <p:oleObj spid="_x0000_s1045" name="Equation" r:id="rId5" imgW="1917360" imgH="914400" progId="Equation.3">
                   <p:embed/>
                 </p:oleObj>
               </mc:Choice>
@@ -12349,7 +12973,7 @@
           <a:graphicData uri="http://schemas.openxmlformats.org/presentationml/2006/ole">
             <mc:AlternateContent xmlns:mc="http://schemas.openxmlformats.org/markup-compatibility/2006">
               <mc:Choice xmlns:v="urn:schemas-microsoft-com:vml" Requires="v">
-                <p:oleObj spid="_x0000_s1040" name="Equation" r:id="rId7" imgW="1993680" imgH="914400" progId="Equation.3">
+                <p:oleObj spid="_x0000_s1046" name="Equation" r:id="rId7" imgW="1993680" imgH="914400" progId="Equation.3">
                   <p:embed/>
                 </p:oleObj>
               </mc:Choice>
@@ -15288,43 +15912,6 @@
       </p:grpSpPr>
       <p:sp>
         <p:nvSpPr>
-          <p:cNvPr id="5" name="TextBox 4"/>
-          <p:cNvSpPr txBox="1"/>
-          <p:nvPr/>
-        </p:nvSpPr>
-        <p:spPr>
-          <a:xfrm>
-            <a:off x="5824537" y="952500"/>
-            <a:ext cx="1524000" cy="553998"/>
-          </a:xfrm>
-          <a:prstGeom prst="rect">
-            <a:avLst/>
-          </a:prstGeom>
-          <a:noFill/>
-        </p:spPr>
-        <p:txBody>
-          <a:bodyPr wrap="square" rtlCol="0">
-            <a:spAutoFit/>
-          </a:bodyPr>
-          <a:lstStyle/>
-          <a:p>
-            <a:pPr algn="l"/>
-            <a:r>
-              <a:rPr lang="en-US" sz="3000" smtClean="0">
-                <a:latin typeface="PFDinTextCompPro-Italic"/>
-                <a:cs typeface="PFDinTextCompPro-Italic"/>
-              </a:rPr>
-              <a:t>ROC Curve</a:t>
-            </a:r>
-            <a:endParaRPr lang="en-US" sz="3000" dirty="0" smtClean="0">
-              <a:latin typeface="PFDinTextCompPro-Italic"/>
-              <a:cs typeface="PFDinTextCompPro-Italic"/>
-            </a:endParaRPr>
-          </a:p>
-        </p:txBody>
-      </p:sp>
-      <p:sp>
-        <p:nvSpPr>
           <p:cNvPr id="4" name="Content Placeholder 3"/>
           <p:cNvSpPr>
             <a:spLocks noGrp="1"/>
@@ -15814,38 +16401,16 @@
           </a:graphicData>
         </a:graphic>
       </p:graphicFrame>
-      <p:graphicFrame>
-        <p:nvGraphicFramePr>
-          <p:cNvPr id="3" name="Chart 2"/>
-          <p:cNvGraphicFramePr/>
-          <p:nvPr>
-            <p:extLst>
-              <p:ext uri="{D42A27DB-BD31-4B8C-83A1-F6EECF244321}">
-                <p14:modId xmlns:p14="http://schemas.microsoft.com/office/powerpoint/2010/main" val="1038227618"/>
-              </p:ext>
-            </p:extLst>
-          </p:nvPr>
-        </p:nvGraphicFramePr>
-        <p:xfrm>
-          <a:off x="4300537" y="1485900"/>
-          <a:ext cx="4267201" cy="3223683"/>
-        </p:xfrm>
-        <a:graphic>
-          <a:graphicData uri="http://schemas.openxmlformats.org/drawingml/2006/chart">
-            <c:chart xmlns:c="http://schemas.openxmlformats.org/drawingml/2006/chart" xmlns:r="http://schemas.openxmlformats.org/officeDocument/2006/relationships" r:id="rId3"/>
-          </a:graphicData>
-        </a:graphic>
-      </p:graphicFrame>
       <p:sp>
         <p:nvSpPr>
-          <p:cNvPr id="7" name="TextBox 6"/>
+          <p:cNvPr id="11" name="TextBox 10"/>
           <p:cNvSpPr txBox="1"/>
           <p:nvPr/>
         </p:nvSpPr>
         <p:spPr>
           <a:xfrm>
-            <a:off x="6434137" y="4610100"/>
-            <a:ext cx="685800" cy="553998"/>
+            <a:off x="3767137" y="1104900"/>
+            <a:ext cx="5257800" cy="3877985"/>
           </a:xfrm>
           <a:prstGeom prst="rect">
             <a:avLst/>
@@ -15864,40 +16429,122 @@
                 <a:latin typeface="PFDinTextCompPro-Italic"/>
                 <a:cs typeface="PFDinTextCompPro-Italic"/>
               </a:rPr>
-              <a:t>FPR</a:t>
-            </a:r>
-          </a:p>
-        </p:txBody>
-      </p:sp>
-      <p:sp>
-        <p:nvSpPr>
-          <p:cNvPr id="9" name="TextBox 8"/>
-          <p:cNvSpPr txBox="1"/>
-          <p:nvPr/>
-        </p:nvSpPr>
-        <p:spPr>
-          <a:xfrm>
-            <a:off x="3843337" y="2552700"/>
-            <a:ext cx="685800" cy="553998"/>
-          </a:xfrm>
-          <a:prstGeom prst="rect">
-            <a:avLst/>
-          </a:prstGeom>
-          <a:noFill/>
-        </p:spPr>
-        <p:txBody>
-          <a:bodyPr wrap="square" rtlCol="0">
-            <a:spAutoFit/>
-          </a:bodyPr>
-          <a:lstStyle/>
-          <a:p>
-            <a:pPr algn="l"/>
+              <a:t>The ROC plots the True Positive Rate (TRP)  on the y-axis agains</a:t>
+            </a:r>
             <a:r>
               <a:rPr lang="en-US" sz="3000" dirty="0" smtClean="0">
                 <a:latin typeface="PFDinTextCompPro-Italic"/>
                 <a:cs typeface="PFDinTextCompPro-Italic"/>
               </a:rPr>
+              <a:t>t the False Positive Rate (FPR) on the x-axis.</a:t>
+            </a:r>
+            <a:endParaRPr lang="en-US" sz="3000" dirty="0" smtClean="0">
+              <a:latin typeface="PFDinTextCompPro-Italic"/>
+              <a:cs typeface="PFDinTextCompPro-Italic"/>
+            </a:endParaRPr>
+          </a:p>
+          <a:p>
+            <a:pPr algn="l"/>
+            <a:endParaRPr lang="en-US" sz="1800" u="sng" dirty="0">
+              <a:latin typeface="PFDinTextCompPro-Italic"/>
+              <a:cs typeface="PFDinTextCompPro-Italic"/>
+            </a:endParaRPr>
+          </a:p>
+          <a:p>
+            <a:pPr algn="l"/>
+            <a:r>
+              <a:rPr lang="en-US" sz="3000" u="sng" dirty="0" smtClean="0">
+                <a:latin typeface="PFDinTextCompPro-Italic"/>
+                <a:cs typeface="PFDinTextCompPro-Italic"/>
+              </a:rPr>
               <a:t>TPR</a:t>
+            </a:r>
+            <a:r>
+              <a:rPr lang="en-US" sz="3000" dirty="0" smtClean="0">
+                <a:latin typeface="PFDinTextCompPro-Italic"/>
+                <a:cs typeface="PFDinTextCompPro-Italic"/>
+              </a:rPr>
+              <a:t>: When actual value is </a:t>
+            </a:r>
+            <a:r>
+              <a:rPr lang="en-US" sz="3000" b="1" dirty="0" smtClean="0">
+                <a:latin typeface="PFDinTextCompPro-Italic"/>
+                <a:cs typeface="PFDinTextCompPro-Italic"/>
+              </a:rPr>
+              <a:t>spam</a:t>
+            </a:r>
+            <a:r>
+              <a:rPr lang="en-US" sz="3000" dirty="0" smtClean="0">
+                <a:latin typeface="PFDinTextCompPro-Italic"/>
+                <a:cs typeface="PFDinTextCompPro-Italic"/>
+              </a:rPr>
+              <a:t>, how often is prediction </a:t>
+            </a:r>
+            <a:r>
+              <a:rPr lang="en-US" sz="3000" b="1" dirty="0" smtClean="0">
+                <a:latin typeface="PFDinTextCompPro-Italic"/>
+                <a:cs typeface="PFDinTextCompPro-Italic"/>
+              </a:rPr>
+              <a:t>correct</a:t>
+            </a:r>
+            <a:r>
+              <a:rPr lang="en-US" sz="3000" dirty="0" smtClean="0">
+                <a:latin typeface="PFDinTextCompPro-Italic"/>
+                <a:cs typeface="PFDinTextCompPro-Italic"/>
+              </a:rPr>
+              <a:t>?</a:t>
+            </a:r>
+          </a:p>
+          <a:p>
+            <a:pPr algn="l"/>
+            <a:endParaRPr lang="en-US" sz="1600" dirty="0" smtClean="0">
+              <a:latin typeface="PFDinTextCompPro-Italic"/>
+              <a:cs typeface="PFDinTextCompPro-Italic"/>
+            </a:endParaRPr>
+          </a:p>
+          <a:p>
+            <a:pPr algn="l"/>
+            <a:r>
+              <a:rPr lang="en-US" sz="3000" u="sng" dirty="0" smtClean="0">
+                <a:latin typeface="PFDinTextCompPro-Italic"/>
+                <a:cs typeface="PFDinTextCompPro-Italic"/>
+              </a:rPr>
+              <a:t>FPR</a:t>
+            </a:r>
+            <a:r>
+              <a:rPr lang="en-US" sz="3000" dirty="0" smtClean="0">
+                <a:latin typeface="PFDinTextCompPro-Italic"/>
+                <a:cs typeface="PFDinTextCompPro-Italic"/>
+              </a:rPr>
+              <a:t>: When actual value is </a:t>
+            </a:r>
+            <a:r>
+              <a:rPr lang="en-US" sz="3000" b="1" dirty="0" smtClean="0">
+                <a:latin typeface="PFDinTextCompPro-Italic"/>
+                <a:cs typeface="PFDinTextCompPro-Italic"/>
+              </a:rPr>
+              <a:t>ham</a:t>
+            </a:r>
+            <a:r>
+              <a:rPr lang="en-US" sz="3000" dirty="0" smtClean="0">
+                <a:latin typeface="PFDinTextCompPro-Italic"/>
+                <a:cs typeface="PFDinTextCompPro-Italic"/>
+              </a:rPr>
+              <a:t>, how often is prediction </a:t>
+            </a:r>
+            <a:r>
+              <a:rPr lang="en-US" sz="3000" b="1" dirty="0" smtClean="0">
+                <a:latin typeface="PFDinTextCompPro-Italic"/>
+                <a:cs typeface="PFDinTextCompPro-Italic"/>
+              </a:rPr>
+              <a:t>wrong</a:t>
+            </a:r>
+            <a:r>
+              <a:rPr lang="en-US" sz="3000" dirty="0" smtClean="0">
+                <a:latin typeface="PFDinTextCompPro-Italic"/>
+                <a:cs typeface="PFDinTextCompPro-Italic"/>
+              </a:rPr>
+              <a:t>?</a:t>
             </a:r>
           </a:p>
         </p:txBody>

</xml_diff>